<commit_message>
GMT synchronized with eVITTA server
</commit_message>
<xml_diff>
--- a/basic_scripts/depmap_organization.pptx
+++ b/basic_scripts/depmap_organization.pptx
@@ -3526,31 +3526,7 @@
                   <a:srgbClr val="FF0000"/>
                 </a:solidFill>
               </a:rPr>
-              <a:t>df</a:t>
-            </a:r>
-            <a:r>
-              <a:rPr lang="en-US" err="1">
-                <a:solidFill>
-                  <a:srgbClr val="FF0000"/>
-                </a:solidFill>
-              </a:rPr>
-              <a:t>_</a:t>
-            </a:r>
-            <a:r>
-              <a:rPr lang="en-US">
-                <a:solidFill>
-                  <a:srgbClr val="FF0000"/>
-                </a:solidFill>
-              </a:rPr>
-              <a:t>proteomic_</a:t>
-            </a:r>
-            <a:r>
-              <a:rPr lang="en-US" dirty="0" err="1">
-                <a:solidFill>
-                  <a:srgbClr val="FF0000"/>
-                </a:solidFill>
-              </a:rPr>
-              <a:t>scale.csv</a:t>
+              <a:t>df_proteomic_scale.csv</a:t>
             </a:r>
             <a:endParaRPr lang="en-US" dirty="0">
               <a:solidFill>

</xml_diff>

<commit_message>
depmap df_snv_class/type instruction added
</commit_message>
<xml_diff>
--- a/basic_scripts/depmap_organization.pptx
+++ b/basic_scripts/depmap_organization.pptx
@@ -7,6 +7,7 @@
   <p:sldIdLst>
     <p:sldId id="256" r:id="rId2"/>
     <p:sldId id="257" r:id="rId3"/>
+    <p:sldId id="258" r:id="rId4"/>
   </p:sldIdLst>
   <p:sldSz cx="12192000" cy="6858000"/>
   <p:notesSz cx="6858000" cy="9144000"/>
@@ -260,7 +261,7 @@
           <a:p>
             <a:fld id="{6A4CE534-A775-F24F-B1AA-025852C49FDC}" type="datetimeFigureOut">
               <a:rPr lang="en-US" smtClean="0"/>
-              <a:t>4/23/21</a:t>
+              <a:t>4/30/21</a:t>
             </a:fld>
             <a:endParaRPr lang="en-US"/>
           </a:p>
@@ -458,7 +459,7 @@
           <a:p>
             <a:fld id="{6A4CE534-A775-F24F-B1AA-025852C49FDC}" type="datetimeFigureOut">
               <a:rPr lang="en-US" smtClean="0"/>
-              <a:t>4/23/21</a:t>
+              <a:t>4/30/21</a:t>
             </a:fld>
             <a:endParaRPr lang="en-US"/>
           </a:p>
@@ -666,7 +667,7 @@
           <a:p>
             <a:fld id="{6A4CE534-A775-F24F-B1AA-025852C49FDC}" type="datetimeFigureOut">
               <a:rPr lang="en-US" smtClean="0"/>
-              <a:t>4/23/21</a:t>
+              <a:t>4/30/21</a:t>
             </a:fld>
             <a:endParaRPr lang="en-US"/>
           </a:p>
@@ -864,7 +865,7 @@
           <a:p>
             <a:fld id="{6A4CE534-A775-F24F-B1AA-025852C49FDC}" type="datetimeFigureOut">
               <a:rPr lang="en-US" smtClean="0"/>
-              <a:t>4/23/21</a:t>
+              <a:t>4/30/21</a:t>
             </a:fld>
             <a:endParaRPr lang="en-US"/>
           </a:p>
@@ -1139,7 +1140,7 @@
           <a:p>
             <a:fld id="{6A4CE534-A775-F24F-B1AA-025852C49FDC}" type="datetimeFigureOut">
               <a:rPr lang="en-US" smtClean="0"/>
-              <a:t>4/23/21</a:t>
+              <a:t>4/30/21</a:t>
             </a:fld>
             <a:endParaRPr lang="en-US"/>
           </a:p>
@@ -1404,7 +1405,7 @@
           <a:p>
             <a:fld id="{6A4CE534-A775-F24F-B1AA-025852C49FDC}" type="datetimeFigureOut">
               <a:rPr lang="en-US" smtClean="0"/>
-              <a:t>4/23/21</a:t>
+              <a:t>4/30/21</a:t>
             </a:fld>
             <a:endParaRPr lang="en-US"/>
           </a:p>
@@ -1816,7 +1817,7 @@
           <a:p>
             <a:fld id="{6A4CE534-A775-F24F-B1AA-025852C49FDC}" type="datetimeFigureOut">
               <a:rPr lang="en-US" smtClean="0"/>
-              <a:t>4/23/21</a:t>
+              <a:t>4/30/21</a:t>
             </a:fld>
             <a:endParaRPr lang="en-US"/>
           </a:p>
@@ -1957,7 +1958,7 @@
           <a:p>
             <a:fld id="{6A4CE534-A775-F24F-B1AA-025852C49FDC}" type="datetimeFigureOut">
               <a:rPr lang="en-US" smtClean="0"/>
-              <a:t>4/23/21</a:t>
+              <a:t>4/30/21</a:t>
             </a:fld>
             <a:endParaRPr lang="en-US"/>
           </a:p>
@@ -2070,7 +2071,7 @@
           <a:p>
             <a:fld id="{6A4CE534-A775-F24F-B1AA-025852C49FDC}" type="datetimeFigureOut">
               <a:rPr lang="en-US" smtClean="0"/>
-              <a:t>4/23/21</a:t>
+              <a:t>4/30/21</a:t>
             </a:fld>
             <a:endParaRPr lang="en-US"/>
           </a:p>
@@ -2381,7 +2382,7 @@
           <a:p>
             <a:fld id="{6A4CE534-A775-F24F-B1AA-025852C49FDC}" type="datetimeFigureOut">
               <a:rPr lang="en-US" smtClean="0"/>
-              <a:t>4/23/21</a:t>
+              <a:t>4/30/21</a:t>
             </a:fld>
             <a:endParaRPr lang="en-US"/>
           </a:p>
@@ -2669,7 +2670,7 @@
           <a:p>
             <a:fld id="{6A4CE534-A775-F24F-B1AA-025852C49FDC}" type="datetimeFigureOut">
               <a:rPr lang="en-US" smtClean="0"/>
-              <a:t>4/23/21</a:t>
+              <a:t>4/30/21</a:t>
             </a:fld>
             <a:endParaRPr lang="en-US"/>
           </a:p>
@@ -2910,7 +2911,7 @@
           <a:p>
             <a:fld id="{6A4CE534-A775-F24F-B1AA-025852C49FDC}" type="datetimeFigureOut">
               <a:rPr lang="en-US" smtClean="0"/>
-              <a:t>4/23/21</a:t>
+              <a:t>4/30/21</a:t>
             </a:fld>
             <a:endParaRPr lang="en-US"/>
           </a:p>
@@ -4052,6 +4053,217 @@
 </p:sld>
 </file>
 
+<file path=ppt/slides/slide3.xml><?xml version="1.0" encoding="utf-8"?>
+<p:sld xmlns:a="http://schemas.openxmlformats.org/drawingml/2006/main" xmlns:r="http://schemas.openxmlformats.org/officeDocument/2006/relationships" xmlns:p="http://schemas.openxmlformats.org/presentationml/2006/main">
+  <p:cSld>
+    <p:spTree>
+      <p:nvGrpSpPr>
+        <p:cNvPr id="1" name=""/>
+        <p:cNvGrpSpPr/>
+        <p:nvPr/>
+      </p:nvGrpSpPr>
+      <p:grpSpPr>
+        <a:xfrm>
+          <a:off x="0" y="0"/>
+          <a:ext cx="0" cy="0"/>
+          <a:chOff x="0" y="0"/>
+          <a:chExt cx="0" cy="0"/>
+        </a:xfrm>
+      </p:grpSpPr>
+      <p:sp>
+        <p:nvSpPr>
+          <p:cNvPr id="2" name="TextBox 1">
+            <a:extLst>
+              <a:ext uri="{FF2B5EF4-FFF2-40B4-BE49-F238E27FC236}">
+                <a16:creationId xmlns:a16="http://schemas.microsoft.com/office/drawing/2014/main" id="{E1177040-DAC8-B641-B8AF-00DFDC6CEC3E}"/>
+              </a:ext>
+            </a:extLst>
+          </p:cNvPr>
+          <p:cNvSpPr txBox="1"/>
+          <p:nvPr/>
+        </p:nvSpPr>
+        <p:spPr>
+          <a:xfrm>
+            <a:off x="466725" y="354330"/>
+            <a:ext cx="11258550" cy="2031325"/>
+          </a:xfrm>
+          <a:prstGeom prst="rect">
+            <a:avLst/>
+          </a:prstGeom>
+          <a:noFill/>
+        </p:spPr>
+        <p:txBody>
+          <a:bodyPr wrap="square" rtlCol="0">
+            <a:spAutoFit/>
+          </a:bodyPr>
+          <a:lstStyle/>
+          <a:p>
+            <a:r>
+              <a:rPr lang="en-US" b="1" dirty="0" err="1"/>
+              <a:t>df_snv_class.csv</a:t>
+            </a:r>
+            <a:r>
+              <a:rPr lang="zh-TW" altLang="en-US" b="1" dirty="0"/>
+              <a:t>和</a:t>
+            </a:r>
+            <a:r>
+              <a:rPr lang="en-US" altLang="zh-TW" b="1" dirty="0" err="1"/>
+              <a:t>df_snv_type.csv</a:t>
+            </a:r>
+            <a:endParaRPr lang="en-US" dirty="0"/>
+          </a:p>
+          <a:p>
+            <a:endParaRPr lang="en-US" dirty="0"/>
+          </a:p>
+          <a:p>
+            <a:r>
+              <a:rPr lang="zh-TW" altLang="en-US" dirty="0"/>
+              <a:t>第一列</a:t>
+            </a:r>
+            <a:r>
+              <a:rPr lang="zh-CN" altLang="en-US" dirty="0"/>
+              <a:t>：</a:t>
+            </a:r>
+            <a:r>
+              <a:rPr lang="en-US" altLang="zh-CN" dirty="0" err="1"/>
+              <a:t>patient_id</a:t>
+            </a:r>
+            <a:r>
+              <a:rPr lang="en-US" altLang="zh-CN" dirty="0"/>
+              <a:t> &lt;- </a:t>
+            </a:r>
+            <a:r>
+              <a:rPr lang="en-US" altLang="zh-CN" dirty="0" err="1"/>
+              <a:t>DepMap_ID</a:t>
+            </a:r>
+            <a:endParaRPr lang="en-US" altLang="zh-CN" dirty="0"/>
+          </a:p>
+          <a:p>
+            <a:r>
+              <a:rPr lang="zh-TW" altLang="en-US" dirty="0"/>
+              <a:t>第二到</a:t>
+            </a:r>
+            <a:r>
+              <a:rPr lang="en-US" altLang="zh-TW" dirty="0"/>
+              <a:t>N</a:t>
+            </a:r>
+            <a:r>
+              <a:rPr lang="zh-TW" altLang="en-US" dirty="0"/>
+              <a:t>列</a:t>
+            </a:r>
+            <a:r>
+              <a:rPr lang="zh-CN" altLang="en-US" dirty="0"/>
+              <a:t>：</a:t>
+            </a:r>
+            <a:r>
+              <a:rPr lang="en-US" altLang="zh-CN" dirty="0"/>
+              <a:t>unique</a:t>
+            </a:r>
+            <a:r>
+              <a:rPr lang="zh-TW" altLang="en-US" dirty="0"/>
+              <a:t>后的</a:t>
+            </a:r>
+            <a:r>
+              <a:rPr lang="en-CA" altLang="zh-CN" dirty="0" err="1"/>
+              <a:t>Hugo_Symbol</a:t>
+            </a:r>
+            <a:r>
+              <a:rPr lang="zh-TW" altLang="en-US" dirty="0"/>
+              <a:t>们</a:t>
+            </a:r>
+            <a:r>
+              <a:rPr lang="zh-CN" altLang="en-US" dirty="0"/>
+              <a:t>；</a:t>
+            </a:r>
+            <a:r>
+              <a:rPr lang="zh-TW" altLang="en-US" dirty="0"/>
+              <a:t>需要做一下</a:t>
+            </a:r>
+            <a:r>
+              <a:rPr lang="en-US" altLang="zh-TW" dirty="0"/>
+              <a:t>ID</a:t>
+            </a:r>
+            <a:r>
+              <a:rPr lang="zh-CN" altLang="en-US" dirty="0"/>
+              <a:t> </a:t>
+            </a:r>
+            <a:r>
+              <a:rPr lang="en-US" altLang="zh-CN" dirty="0"/>
+              <a:t>conversion</a:t>
+            </a:r>
+          </a:p>
+          <a:p>
+            <a:r>
+              <a:rPr lang="zh-TW" altLang="en-US" dirty="0"/>
+              <a:t>填数据</a:t>
+            </a:r>
+            <a:r>
+              <a:rPr lang="zh-CN" altLang="en-US" dirty="0"/>
+              <a:t>：</a:t>
+            </a:r>
+            <a:r>
+              <a:rPr lang="en-CA" altLang="zh-CN" dirty="0"/>
+              <a:t> </a:t>
+            </a:r>
+            <a:r>
+              <a:rPr lang="en-CA" altLang="zh-CN" dirty="0" err="1"/>
+              <a:t>Variant_Classification</a:t>
+            </a:r>
+            <a:r>
+              <a:rPr lang="zh-TW" altLang="en-CA" dirty="0"/>
+              <a:t>填进</a:t>
+            </a:r>
+            <a:r>
+              <a:rPr lang="en-US" altLang="zh-TW" dirty="0" err="1"/>
+              <a:t>df_snv_class.csv</a:t>
+            </a:r>
+            <a:r>
+              <a:rPr lang="zh-CN" altLang="en-US" dirty="0"/>
+              <a:t>，</a:t>
+            </a:r>
+            <a:r>
+              <a:rPr lang="en-CA" altLang="zh-CN" dirty="0"/>
+              <a:t> </a:t>
+            </a:r>
+            <a:r>
+              <a:rPr lang="en-CA" altLang="zh-CN" dirty="0" err="1"/>
+              <a:t>Variant_Type</a:t>
+            </a:r>
+            <a:r>
+              <a:rPr lang="zh-TW" altLang="en-CA" dirty="0"/>
+              <a:t>填进</a:t>
+            </a:r>
+            <a:r>
+              <a:rPr lang="en-US" altLang="zh-TW" dirty="0" err="1"/>
+              <a:t>df</a:t>
+            </a:r>
+            <a:r>
+              <a:rPr lang="en-US" altLang="zh-CN" dirty="0" err="1"/>
+              <a:t>_snv_type.csv</a:t>
+            </a:r>
+            <a:endParaRPr lang="en-CA" altLang="zh-CN" dirty="0"/>
+          </a:p>
+          <a:p>
+            <a:endParaRPr lang="en-CA" altLang="zh-CN" dirty="0"/>
+          </a:p>
+          <a:p>
+            <a:endParaRPr lang="en-US" dirty="0"/>
+          </a:p>
+        </p:txBody>
+      </p:sp>
+    </p:spTree>
+    <p:extLst>
+      <p:ext uri="{BB962C8B-B14F-4D97-AF65-F5344CB8AC3E}">
+        <p14:creationId xmlns:p14="http://schemas.microsoft.com/office/powerpoint/2010/main" val="10381867"/>
+      </p:ext>
+    </p:extLst>
+  </p:cSld>
+  <p:clrMapOvr>
+    <a:masterClrMapping/>
+  </p:clrMapOvr>
+</p:sld>
+</file>
+
 <file path=ppt/theme/theme1.xml><?xml version="1.0" encoding="utf-8"?>
 <a:theme xmlns:a="http://schemas.openxmlformats.org/drawingml/2006/main" name="Office Theme">
   <a:themeElements>

</xml_diff>